<commit_message>
Add bit about virtual box
</commit_message>
<xml_diff>
--- a/2017/misc/intro.pptx
+++ b/2017/misc/intro.pptx
@@ -5,7 +5,7 @@
     <p:sldMasterId id="2147483648" r:id="rId1"/>
   </p:sldMasterIdLst>
   <p:notesMasterIdLst>
-    <p:notesMasterId r:id="rId16"/>
+    <p:notesMasterId r:id="rId17"/>
   </p:notesMasterIdLst>
   <p:sldIdLst>
     <p:sldId id="256" r:id="rId2"/>
@@ -22,6 +22,7 @@
     <p:sldId id="265" r:id="rId13"/>
     <p:sldId id="262" r:id="rId14"/>
     <p:sldId id="270" r:id="rId15"/>
+    <p:sldId id="272" r:id="rId16"/>
   </p:sldIdLst>
   <p:sldSz cx="13004800" cy="9753600"/>
   <p:notesSz cx="6858000" cy="9144000"/>
@@ -2606,11 +2607,7 @@
             </a:r>
             <a:r>
               <a:rPr lang="en-US" dirty="0" err="1" smtClean="0"/>
-              <a:t>institute</a:t>
-            </a:r>
-            <a:r>
-              <a:rPr lang="en-US" dirty="0" err="1" smtClean="0"/>
-              <a:t>.slack.com</a:t>
+              <a:t>institute.slack.com</a:t>
             </a:r>
             <a:endParaRPr lang="en-US" dirty="0" smtClean="0"/>
           </a:p>
@@ -3115,6 +3112,125 @@
     <p:extLst>
       <p:ext uri="{BB962C8B-B14F-4D97-AF65-F5344CB8AC3E}">
         <p14:creationId xmlns:p14="http://schemas.microsoft.com/office/powerpoint/2010/main" val="2261228573"/>
+      </p:ext>
+    </p:extLst>
+  </p:cSld>
+  <p:clrMapOvr>
+    <a:masterClrMapping/>
+  </p:clrMapOvr>
+  <p:transition xmlns:p14="http://schemas.microsoft.com/office/powerpoint/2010/main" spd="med"/>
+</p:sld>
+</file>
+
+<file path=ppt/slides/slide15.xml><?xml version="1.0" encoding="utf-8"?>
+<p:sld xmlns:a="http://schemas.openxmlformats.org/drawingml/2006/main" xmlns:r="http://schemas.openxmlformats.org/officeDocument/2006/relationships" xmlns:p="http://schemas.openxmlformats.org/presentationml/2006/main">
+  <p:cSld>
+    <p:spTree>
+      <p:nvGrpSpPr>
+        <p:cNvPr id="1" name=""/>
+        <p:cNvGrpSpPr/>
+        <p:nvPr/>
+      </p:nvGrpSpPr>
+      <p:grpSpPr>
+        <a:xfrm>
+          <a:off x="0" y="0"/>
+          <a:ext cx="0" cy="0"/>
+          <a:chOff x="0" y="0"/>
+          <a:chExt cx="0" cy="0"/>
+        </a:xfrm>
+      </p:grpSpPr>
+      <p:sp>
+        <p:nvSpPr>
+          <p:cNvPr id="2" name="Title 1"/>
+          <p:cNvSpPr>
+            <a:spLocks noGrp="1"/>
+          </p:cNvSpPr>
+          <p:nvPr>
+            <p:ph type="title"/>
+          </p:nvPr>
+        </p:nvSpPr>
+        <p:spPr/>
+        <p:txBody>
+          <a:bodyPr/>
+          <a:lstStyle/>
+          <a:p>
+            <a:r>
+              <a:rPr lang="en-US" dirty="0" smtClean="0"/>
+              <a:t>Virtual Box </a:t>
+            </a:r>
+            <a:r>
+              <a:rPr lang="mr-IN" dirty="0" smtClean="0"/>
+              <a:t>–</a:t>
+            </a:r>
+            <a:r>
+              <a:rPr lang="en-US" dirty="0" smtClean="0"/>
+              <a:t> Linux/Mint</a:t>
+            </a:r>
+            <a:endParaRPr lang="en-US" dirty="0"/>
+          </a:p>
+        </p:txBody>
+      </p:sp>
+      <p:sp>
+        <p:nvSpPr>
+          <p:cNvPr id="3" name="Text Placeholder 2"/>
+          <p:cNvSpPr>
+            <a:spLocks noGrp="1"/>
+          </p:cNvSpPr>
+          <p:nvPr>
+            <p:ph type="body" idx="1"/>
+          </p:nvPr>
+        </p:nvSpPr>
+        <p:spPr/>
+        <p:txBody>
+          <a:bodyPr>
+            <a:noAutofit/>
+          </a:bodyPr>
+          <a:lstStyle/>
+          <a:p>
+            <a:r>
+              <a:rPr lang="en-US" sz="3300" dirty="0" smtClean="0"/>
+              <a:t>UT is a Windows campus</a:t>
+            </a:r>
+          </a:p>
+          <a:p>
+            <a:r>
+              <a:rPr lang="en-US" sz="3300" dirty="0" smtClean="0"/>
+              <a:t>We're running a virtual box so everyone has the same OS.</a:t>
+            </a:r>
+          </a:p>
+          <a:p>
+            <a:r>
+              <a:rPr lang="en-US" sz="3300" dirty="0" smtClean="0"/>
+              <a:t>Functionally, your computer is pretending to be a different computer. Just need to know how to get to it.</a:t>
+            </a:r>
+          </a:p>
+          <a:p>
+            <a:r>
+              <a:rPr lang="en-US" sz="3300" dirty="0" smtClean="0"/>
+              <a:t>Will be </a:t>
+            </a:r>
+            <a:r>
+              <a:rPr lang="en-US" sz="3300" u="sng" dirty="0" smtClean="0"/>
+              <a:t>very</a:t>
+            </a:r>
+            <a:r>
+              <a:rPr lang="en-US" sz="3300" dirty="0" smtClean="0"/>
+              <a:t> similar to a Mac. Windows would be different.</a:t>
+            </a:r>
+          </a:p>
+          <a:p>
+            <a:r>
+              <a:rPr lang="en-US" sz="3300" dirty="0" smtClean="0"/>
+              <a:t>We can get things running on your computer throughout the week if you reach out to Brandon</a:t>
+            </a:r>
+            <a:endParaRPr lang="en-US" sz="3300" dirty="0"/>
+          </a:p>
+        </p:txBody>
+      </p:sp>
+    </p:spTree>
+    <p:extLst>
+      <p:ext uri="{BB962C8B-B14F-4D97-AF65-F5344CB8AC3E}">
+        <p14:creationId xmlns:p14="http://schemas.microsoft.com/office/powerpoint/2010/main" val="247635032"/>
       </p:ext>
     </p:extLst>
   </p:cSld>
@@ -4223,11 +4339,7 @@
           <a:p>
             <a:r>
               <a:rPr lang="en-US" dirty="0" smtClean="0"/>
-              <a:t>Play a game</a:t>
-            </a:r>
-            <a:r>
-              <a:rPr lang="en-US" dirty="0" smtClean="0"/>
-              <a:t>…Brandon loves icebreakers</a:t>
+              <a:t>Play a game…Brandon loves icebreakers</a:t>
             </a:r>
             <a:endParaRPr lang="en-US" dirty="0"/>
           </a:p>

</xml_diff>